<commit_message>
Fix style temlates. Add poetry.lock into gitignore. Remove extra libraries.
</commit_message>
<xml_diff>
--- a/make_presentation/templates/templates/style/0.pptx
+++ b/make_presentation/templates/templates/style/0.pptx
@@ -63,7 +63,7 @@
         <p:txBody>
           <a:bodyPr/>
           <a:p>
-            <a:fld id="{4B914FB8-F8B5-4CFC-B2EB-05D6D1A8CBAF}" type="slidenum">
+            <a:fld id="{58355A98-4DDA-424B-97EA-E274DAE620FF}" type="slidenum">
               <a:t>&lt;#&gt;</a:t>
             </a:fld>
           </a:p>
@@ -114,7 +114,7 @@
       </p:grpSpPr>
       <p:sp>
         <p:nvSpPr>
-          <p:cNvPr id="26" name="PlaceHolder 1"/>
+          <p:cNvPr id="24" name="PlaceHolder 1"/>
           <p:cNvSpPr>
             <a:spLocks noGrp="1"/>
           </p:cNvSpPr>
@@ -151,7 +151,7 @@
       </p:sp>
       <p:sp>
         <p:nvSpPr>
-          <p:cNvPr id="27" name="PlaceHolder 2"/>
+          <p:cNvPr id="25" name="PlaceHolder 2"/>
           <p:cNvSpPr>
             <a:spLocks noGrp="1"/>
           </p:cNvSpPr>
@@ -185,7 +185,7 @@
       </p:sp>
       <p:sp>
         <p:nvSpPr>
-          <p:cNvPr id="28" name="PlaceHolder 3"/>
+          <p:cNvPr id="26" name="PlaceHolder 3"/>
           <p:cNvSpPr>
             <a:spLocks noGrp="1"/>
           </p:cNvSpPr>
@@ -251,7 +251,7 @@
         <p:txBody>
           <a:bodyPr/>
           <a:p>
-            <a:fld id="{E9AC66AE-6B55-4D99-B0A2-52A63BBFCB3A}" type="slidenum">
+            <a:fld id="{0856592B-D0D3-4855-84D9-7258A716DB98}" type="slidenum">
               <a:t>&lt;#&gt;</a:t>
             </a:fld>
           </a:p>
@@ -302,7 +302,7 @@
       </p:grpSpPr>
       <p:sp>
         <p:nvSpPr>
-          <p:cNvPr id="29" name="PlaceHolder 1"/>
+          <p:cNvPr id="27" name="PlaceHolder 1"/>
           <p:cNvSpPr>
             <a:spLocks noGrp="1"/>
           </p:cNvSpPr>
@@ -339,7 +339,7 @@
       </p:sp>
       <p:sp>
         <p:nvSpPr>
-          <p:cNvPr id="30" name="PlaceHolder 2"/>
+          <p:cNvPr id="28" name="PlaceHolder 2"/>
           <p:cNvSpPr>
             <a:spLocks noGrp="1"/>
           </p:cNvSpPr>
@@ -373,7 +373,7 @@
       </p:sp>
       <p:sp>
         <p:nvSpPr>
-          <p:cNvPr id="31" name="PlaceHolder 3"/>
+          <p:cNvPr id="29" name="PlaceHolder 3"/>
           <p:cNvSpPr>
             <a:spLocks noGrp="1"/>
           </p:cNvSpPr>
@@ -407,7 +407,7 @@
       </p:sp>
       <p:sp>
         <p:nvSpPr>
-          <p:cNvPr id="32" name="PlaceHolder 4"/>
+          <p:cNvPr id="30" name="PlaceHolder 4"/>
           <p:cNvSpPr>
             <a:spLocks noGrp="1"/>
           </p:cNvSpPr>
@@ -441,7 +441,7 @@
       </p:sp>
       <p:sp>
         <p:nvSpPr>
-          <p:cNvPr id="33" name="PlaceHolder 5"/>
+          <p:cNvPr id="31" name="PlaceHolder 5"/>
           <p:cNvSpPr>
             <a:spLocks noGrp="1"/>
           </p:cNvSpPr>
@@ -507,7 +507,7 @@
         <p:txBody>
           <a:bodyPr/>
           <a:p>
-            <a:fld id="{FF25E538-0620-4AA9-B09D-6B8F766B2835}" type="slidenum">
+            <a:fld id="{367FD369-C8EA-402C-9772-0A1FDB1403AC}" type="slidenum">
               <a:t>&lt;#&gt;</a:t>
             </a:fld>
           </a:p>
@@ -558,7 +558,7 @@
       </p:grpSpPr>
       <p:sp>
         <p:nvSpPr>
-          <p:cNvPr id="34" name="PlaceHolder 1"/>
+          <p:cNvPr id="32" name="PlaceHolder 1"/>
           <p:cNvSpPr>
             <a:spLocks noGrp="1"/>
           </p:cNvSpPr>
@@ -595,7 +595,7 @@
       </p:sp>
       <p:sp>
         <p:nvSpPr>
-          <p:cNvPr id="35" name="PlaceHolder 2"/>
+          <p:cNvPr id="33" name="PlaceHolder 2"/>
           <p:cNvSpPr>
             <a:spLocks noGrp="1"/>
           </p:cNvSpPr>
@@ -629,7 +629,7 @@
       </p:sp>
       <p:sp>
         <p:nvSpPr>
-          <p:cNvPr id="36" name="PlaceHolder 3"/>
+          <p:cNvPr id="34" name="PlaceHolder 3"/>
           <p:cNvSpPr>
             <a:spLocks noGrp="1"/>
           </p:cNvSpPr>
@@ -663,7 +663,7 @@
       </p:sp>
       <p:sp>
         <p:nvSpPr>
-          <p:cNvPr id="37" name="PlaceHolder 4"/>
+          <p:cNvPr id="35" name="PlaceHolder 4"/>
           <p:cNvSpPr>
             <a:spLocks noGrp="1"/>
           </p:cNvSpPr>
@@ -697,7 +697,7 @@
       </p:sp>
       <p:sp>
         <p:nvSpPr>
-          <p:cNvPr id="38" name="PlaceHolder 5"/>
+          <p:cNvPr id="36" name="PlaceHolder 5"/>
           <p:cNvSpPr>
             <a:spLocks noGrp="1"/>
           </p:cNvSpPr>
@@ -731,7 +731,7 @@
       </p:sp>
       <p:sp>
         <p:nvSpPr>
-          <p:cNvPr id="39" name="PlaceHolder 6"/>
+          <p:cNvPr id="37" name="PlaceHolder 6"/>
           <p:cNvSpPr>
             <a:spLocks noGrp="1"/>
           </p:cNvSpPr>
@@ -765,7 +765,7 @@
       </p:sp>
       <p:sp>
         <p:nvSpPr>
-          <p:cNvPr id="40" name="PlaceHolder 7"/>
+          <p:cNvPr id="38" name="PlaceHolder 7"/>
           <p:cNvSpPr>
             <a:spLocks noGrp="1"/>
           </p:cNvSpPr>
@@ -831,7 +831,7 @@
         <p:txBody>
           <a:bodyPr/>
           <a:p>
-            <a:fld id="{6BE5B54C-8E86-4C97-8791-1FF77A5ADB9D}" type="slidenum">
+            <a:fld id="{70AA3B9B-6657-4590-AF89-7B6CE454504A}" type="slidenum">
               <a:t>&lt;#&gt;</a:t>
             </a:fld>
           </a:p>
@@ -882,7 +882,7 @@
       </p:grpSpPr>
       <p:sp>
         <p:nvSpPr>
-          <p:cNvPr id="5" name="PlaceHolder 1"/>
+          <p:cNvPr id="3" name="PlaceHolder 1"/>
           <p:cNvSpPr>
             <a:spLocks noGrp="1"/>
           </p:cNvSpPr>
@@ -919,7 +919,7 @@
       </p:sp>
       <p:sp>
         <p:nvSpPr>
-          <p:cNvPr id="6" name="PlaceHolder 2"/>
+          <p:cNvPr id="4" name="PlaceHolder 2"/>
           <p:cNvSpPr>
             <a:spLocks noGrp="1"/>
           </p:cNvSpPr>
@@ -988,7 +988,7 @@
         <p:txBody>
           <a:bodyPr/>
           <a:p>
-            <a:fld id="{AC586716-1A7A-47CB-BBB2-D230A5617951}" type="slidenum">
+            <a:fld id="{5B68370F-5709-4107-AB81-06C51FB198FD}" type="slidenum">
               <a:t>&lt;#&gt;</a:t>
             </a:fld>
           </a:p>
@@ -1039,7 +1039,7 @@
       </p:grpSpPr>
       <p:sp>
         <p:nvSpPr>
-          <p:cNvPr id="7" name="PlaceHolder 1"/>
+          <p:cNvPr id="5" name="PlaceHolder 1"/>
           <p:cNvSpPr>
             <a:spLocks noGrp="1"/>
           </p:cNvSpPr>
@@ -1076,7 +1076,7 @@
       </p:sp>
       <p:sp>
         <p:nvSpPr>
-          <p:cNvPr id="8" name="PlaceHolder 2"/>
+          <p:cNvPr id="6" name="PlaceHolder 2"/>
           <p:cNvSpPr>
             <a:spLocks noGrp="1"/>
           </p:cNvSpPr>
@@ -1142,7 +1142,7 @@
         <p:txBody>
           <a:bodyPr/>
           <a:p>
-            <a:fld id="{5A20DFDE-CFA1-4B99-8785-EA06F03AAB04}" type="slidenum">
+            <a:fld id="{95D65A83-2910-499C-83DC-D803405C1773}" type="slidenum">
               <a:t>&lt;#&gt;</a:t>
             </a:fld>
           </a:p>
@@ -1193,7 +1193,7 @@
       </p:grpSpPr>
       <p:sp>
         <p:nvSpPr>
-          <p:cNvPr id="9" name="PlaceHolder 1"/>
+          <p:cNvPr id="7" name="PlaceHolder 1"/>
           <p:cNvSpPr>
             <a:spLocks noGrp="1"/>
           </p:cNvSpPr>
@@ -1230,7 +1230,7 @@
       </p:sp>
       <p:sp>
         <p:nvSpPr>
-          <p:cNvPr id="10" name="PlaceHolder 2"/>
+          <p:cNvPr id="8" name="PlaceHolder 2"/>
           <p:cNvSpPr>
             <a:spLocks noGrp="1"/>
           </p:cNvSpPr>
@@ -1264,7 +1264,7 @@
       </p:sp>
       <p:sp>
         <p:nvSpPr>
-          <p:cNvPr id="11" name="PlaceHolder 3"/>
+          <p:cNvPr id="9" name="PlaceHolder 3"/>
           <p:cNvSpPr>
             <a:spLocks noGrp="1"/>
           </p:cNvSpPr>
@@ -1330,7 +1330,7 @@
         <p:txBody>
           <a:bodyPr/>
           <a:p>
-            <a:fld id="{6950A155-9356-4D56-B322-279E8C42A73A}" type="slidenum">
+            <a:fld id="{33938732-E740-4CD3-BCC6-B5E4FB672910}" type="slidenum">
               <a:t>&lt;#&gt;</a:t>
             </a:fld>
           </a:p>
@@ -1381,7 +1381,7 @@
       </p:grpSpPr>
       <p:sp>
         <p:nvSpPr>
-          <p:cNvPr id="12" name="PlaceHolder 1"/>
+          <p:cNvPr id="10" name="PlaceHolder 1"/>
           <p:cNvSpPr>
             <a:spLocks noGrp="1"/>
           </p:cNvSpPr>
@@ -1450,7 +1450,7 @@
         <p:txBody>
           <a:bodyPr/>
           <a:p>
-            <a:fld id="{D70C3825-E042-4E1D-9BAC-98823E7409E1}" type="slidenum">
+            <a:fld id="{95D2F46D-BCB7-455E-BDC0-2FE9C067F7B1}" type="slidenum">
               <a:t>&lt;#&gt;</a:t>
             </a:fld>
           </a:p>
@@ -1501,7 +1501,7 @@
       </p:grpSpPr>
       <p:sp>
         <p:nvSpPr>
-          <p:cNvPr id="13" name="PlaceHolder 1"/>
+          <p:cNvPr id="11" name="PlaceHolder 1"/>
           <p:cNvSpPr>
             <a:spLocks noGrp="1"/>
           </p:cNvSpPr>
@@ -1570,7 +1570,7 @@
         <p:txBody>
           <a:bodyPr/>
           <a:p>
-            <a:fld id="{372052DF-BC51-4E04-B08A-181DD6CF6C9B}" type="slidenum">
+            <a:fld id="{924D23D9-8683-48CE-9ABD-D3986AF8090D}" type="slidenum">
               <a:t>&lt;#&gt;</a:t>
             </a:fld>
           </a:p>
@@ -1621,7 +1621,7 @@
       </p:grpSpPr>
       <p:sp>
         <p:nvSpPr>
-          <p:cNvPr id="14" name="PlaceHolder 1"/>
+          <p:cNvPr id="12" name="PlaceHolder 1"/>
           <p:cNvSpPr>
             <a:spLocks noGrp="1"/>
           </p:cNvSpPr>
@@ -1658,7 +1658,7 @@
       </p:sp>
       <p:sp>
         <p:nvSpPr>
-          <p:cNvPr id="15" name="PlaceHolder 2"/>
+          <p:cNvPr id="13" name="PlaceHolder 2"/>
           <p:cNvSpPr>
             <a:spLocks noGrp="1"/>
           </p:cNvSpPr>
@@ -1692,7 +1692,7 @@
       </p:sp>
       <p:sp>
         <p:nvSpPr>
-          <p:cNvPr id="16" name="PlaceHolder 3"/>
+          <p:cNvPr id="14" name="PlaceHolder 3"/>
           <p:cNvSpPr>
             <a:spLocks noGrp="1"/>
           </p:cNvSpPr>
@@ -1726,7 +1726,7 @@
       </p:sp>
       <p:sp>
         <p:nvSpPr>
-          <p:cNvPr id="17" name="PlaceHolder 4"/>
+          <p:cNvPr id="15" name="PlaceHolder 4"/>
           <p:cNvSpPr>
             <a:spLocks noGrp="1"/>
           </p:cNvSpPr>
@@ -1792,7 +1792,7 @@
         <p:txBody>
           <a:bodyPr/>
           <a:p>
-            <a:fld id="{D70363C6-524A-40C5-B3F9-3D53394F25DC}" type="slidenum">
+            <a:fld id="{C9D770F9-BCE9-4D6A-8963-0330028CBE80}" type="slidenum">
               <a:t>&lt;#&gt;</a:t>
             </a:fld>
           </a:p>
@@ -1843,7 +1843,7 @@
       </p:grpSpPr>
       <p:sp>
         <p:nvSpPr>
-          <p:cNvPr id="18" name="PlaceHolder 1"/>
+          <p:cNvPr id="16" name="PlaceHolder 1"/>
           <p:cNvSpPr>
             <a:spLocks noGrp="1"/>
           </p:cNvSpPr>
@@ -1880,7 +1880,7 @@
       </p:sp>
       <p:sp>
         <p:nvSpPr>
-          <p:cNvPr id="19" name="PlaceHolder 2"/>
+          <p:cNvPr id="17" name="PlaceHolder 2"/>
           <p:cNvSpPr>
             <a:spLocks noGrp="1"/>
           </p:cNvSpPr>
@@ -1914,7 +1914,7 @@
       </p:sp>
       <p:sp>
         <p:nvSpPr>
-          <p:cNvPr id="20" name="PlaceHolder 3"/>
+          <p:cNvPr id="18" name="PlaceHolder 3"/>
           <p:cNvSpPr>
             <a:spLocks noGrp="1"/>
           </p:cNvSpPr>
@@ -1948,7 +1948,7 @@
       </p:sp>
       <p:sp>
         <p:nvSpPr>
-          <p:cNvPr id="21" name="PlaceHolder 4"/>
+          <p:cNvPr id="19" name="PlaceHolder 4"/>
           <p:cNvSpPr>
             <a:spLocks noGrp="1"/>
           </p:cNvSpPr>
@@ -2014,7 +2014,7 @@
         <p:txBody>
           <a:bodyPr/>
           <a:p>
-            <a:fld id="{88E92DDD-C438-415C-9049-CFEEC41D5268}" type="slidenum">
+            <a:fld id="{04D1592E-D804-4DCE-BFCB-A23E057170A2}" type="slidenum">
               <a:t>&lt;#&gt;</a:t>
             </a:fld>
           </a:p>
@@ -2065,7 +2065,7 @@
       </p:grpSpPr>
       <p:sp>
         <p:nvSpPr>
-          <p:cNvPr id="22" name="PlaceHolder 1"/>
+          <p:cNvPr id="20" name="PlaceHolder 1"/>
           <p:cNvSpPr>
             <a:spLocks noGrp="1"/>
           </p:cNvSpPr>
@@ -2102,7 +2102,7 @@
       </p:sp>
       <p:sp>
         <p:nvSpPr>
-          <p:cNvPr id="23" name="PlaceHolder 2"/>
+          <p:cNvPr id="21" name="PlaceHolder 2"/>
           <p:cNvSpPr>
             <a:spLocks noGrp="1"/>
           </p:cNvSpPr>
@@ -2136,7 +2136,7 @@
       </p:sp>
       <p:sp>
         <p:nvSpPr>
-          <p:cNvPr id="24" name="PlaceHolder 3"/>
+          <p:cNvPr id="22" name="PlaceHolder 3"/>
           <p:cNvSpPr>
             <a:spLocks noGrp="1"/>
           </p:cNvSpPr>
@@ -2170,7 +2170,7 @@
       </p:sp>
       <p:sp>
         <p:nvSpPr>
-          <p:cNvPr id="25" name="PlaceHolder 4"/>
+          <p:cNvPr id="23" name="PlaceHolder 4"/>
           <p:cNvSpPr>
             <a:spLocks noGrp="1"/>
           </p:cNvSpPr>
@@ -2236,7 +2236,7 @@
         <p:txBody>
           <a:bodyPr/>
           <a:p>
-            <a:fld id="{9BFE927A-449E-43A3-86BA-2658C4FAB415}" type="slidenum">
+            <a:fld id="{D899F5A6-89D2-42D4-A234-BD40DBDA6043}" type="slidenum">
               <a:t>&lt;#&gt;</a:t>
             </a:fld>
           </a:p>
@@ -2306,7 +2306,7 @@
         <p:spPr>
           <a:xfrm>
             <a:off x="3029040" y="4767120"/>
-            <a:ext cx="3081960" cy="269640"/>
+            <a:ext cx="3083760" cy="271440"/>
           </a:xfrm>
           <a:prstGeom prst="rect">
             <a:avLst/>
@@ -2363,7 +2363,7 @@
         <p:spPr>
           <a:xfrm>
             <a:off x="6458040" y="4767120"/>
-            <a:ext cx="2053080" cy="269640"/>
+            <a:ext cx="2054880" cy="271440"/>
           </a:xfrm>
           <a:prstGeom prst="rect">
             <a:avLst/>
@@ -2398,7 +2398,7 @@
               </a:lnSpc>
               <a:buNone/>
             </a:pPr>
-            <a:fld id="{D897D158-FBE7-4C3C-8461-CE84510C76CB}" type="slidenum">
+            <a:fld id="{46CCE9DC-DE1C-47C7-AF13-2D1814D6F07D}" type="slidenum">
               <a:rPr b="0" lang="en-US" sz="900" spc="-1" strike="noStrike">
                 <a:solidFill>
                   <a:srgbClr val="8b8b8b"/>
@@ -2426,7 +2426,7 @@
         <p:spPr>
           <a:xfrm>
             <a:off x="628560" y="4767120"/>
-            <a:ext cx="2053080" cy="269640"/>
+            <a:ext cx="2054880" cy="271440"/>
           </a:xfrm>
           <a:prstGeom prst="rect">
             <a:avLst/>
@@ -2456,232 +2456,6 @@
             </a:r>
             <a:endParaRPr b="0" lang="en-US" sz="1400" spc="-1" strike="noStrike">
               <a:latin typeface="Times New Roman"/>
-            </a:endParaRPr>
-          </a:p>
-        </p:txBody>
-      </p:sp>
-      <p:sp>
-        <p:nvSpPr>
-          <p:cNvPr id="3" name="PlaceHolder 4"/>
-          <p:cNvSpPr>
-            <a:spLocks noGrp="1"/>
-          </p:cNvSpPr>
-          <p:nvPr>
-            <p:ph type="title"/>
-          </p:nvPr>
-        </p:nvSpPr>
-        <p:spPr>
-          <a:xfrm>
-            <a:off x="457200" y="205200"/>
-            <a:ext cx="8229240" cy="858600"/>
-          </a:xfrm>
-          <a:prstGeom prst="rect">
-            <a:avLst/>
-          </a:prstGeom>
-          <a:noFill/>
-          <a:ln w="0">
-            <a:noFill/>
-          </a:ln>
-        </p:spPr>
-        <p:txBody>
-          <a:bodyPr lIns="0" rIns="0" tIns="0" bIns="0" anchor="ctr">
-            <a:noAutofit/>
-          </a:bodyPr>
-          <a:p>
-            <a:pPr algn="ctr">
-              <a:buNone/>
-            </a:pPr>
-            <a:r>
-              <a:rPr b="0" lang="en-US" sz="4400" spc="-1" strike="noStrike">
-                <a:latin typeface="Arial"/>
-              </a:rPr>
-              <a:t>Click to edit the title text format</a:t>
-            </a:r>
-            <a:endParaRPr b="0" lang="en-US" sz="4400" spc="-1" strike="noStrike">
-              <a:latin typeface="Arial"/>
-            </a:endParaRPr>
-          </a:p>
-        </p:txBody>
-      </p:sp>
-      <p:sp>
-        <p:nvSpPr>
-          <p:cNvPr id="4" name="PlaceHolder 5"/>
-          <p:cNvSpPr>
-            <a:spLocks noGrp="1"/>
-          </p:cNvSpPr>
-          <p:nvPr>
-            <p:ph type="body"/>
-          </p:nvPr>
-        </p:nvSpPr>
-        <p:spPr>
-          <a:xfrm>
-            <a:off x="457200" y="1203480"/>
-            <a:ext cx="8229240" cy="2982960"/>
-          </a:xfrm>
-          <a:prstGeom prst="rect">
-            <a:avLst/>
-          </a:prstGeom>
-          <a:noFill/>
-          <a:ln w="0">
-            <a:noFill/>
-          </a:ln>
-        </p:spPr>
-        <p:txBody>
-          <a:bodyPr lIns="0" rIns="0" tIns="0" bIns="0" anchor="t">
-            <a:normAutofit/>
-          </a:bodyPr>
-          <a:p>
-            <a:pPr marL="432000" indent="-324000">
-              <a:spcBef>
-                <a:spcPts val="1417"/>
-              </a:spcBef>
-              <a:buClr>
-                <a:srgbClr val="ffffff"/>
-              </a:buClr>
-              <a:buSzPct val="45000"/>
-              <a:buFont typeface="Wingdings" charset="2"/>
-              <a:buChar char=""/>
-            </a:pPr>
-            <a:r>
-              <a:rPr b="0" lang="en-US" sz="3200" spc="-1" strike="noStrike">
-                <a:latin typeface="Arial"/>
-              </a:rPr>
-              <a:t>Click to edit the outline text format</a:t>
-            </a:r>
-            <a:endParaRPr b="0" lang="en-US" sz="3200" spc="-1" strike="noStrike">
-              <a:latin typeface="Arial"/>
-            </a:endParaRPr>
-          </a:p>
-          <a:p>
-            <a:pPr lvl="1" marL="864000" indent="-324000">
-              <a:spcBef>
-                <a:spcPts val="1134"/>
-              </a:spcBef>
-              <a:buClr>
-                <a:srgbClr val="ffffff"/>
-              </a:buClr>
-              <a:buSzPct val="75000"/>
-              <a:buFont typeface="Symbol" charset="2"/>
-              <a:buChar char=""/>
-            </a:pPr>
-            <a:r>
-              <a:rPr b="0" lang="en-US" sz="2800" spc="-1" strike="noStrike">
-                <a:latin typeface="Arial"/>
-              </a:rPr>
-              <a:t>Second Outline Level</a:t>
-            </a:r>
-            <a:endParaRPr b="0" lang="en-US" sz="2800" spc="-1" strike="noStrike">
-              <a:latin typeface="Arial"/>
-            </a:endParaRPr>
-          </a:p>
-          <a:p>
-            <a:pPr lvl="2" marL="1296000" indent="-288000">
-              <a:spcBef>
-                <a:spcPts val="850"/>
-              </a:spcBef>
-              <a:buClr>
-                <a:srgbClr val="ffffff"/>
-              </a:buClr>
-              <a:buSzPct val="45000"/>
-              <a:buFont typeface="Wingdings" charset="2"/>
-              <a:buChar char=""/>
-            </a:pPr>
-            <a:r>
-              <a:rPr b="0" lang="en-US" sz="2400" spc="-1" strike="noStrike">
-                <a:latin typeface="Arial"/>
-              </a:rPr>
-              <a:t>Third Outline Level</a:t>
-            </a:r>
-            <a:endParaRPr b="0" lang="en-US" sz="2400" spc="-1" strike="noStrike">
-              <a:latin typeface="Arial"/>
-            </a:endParaRPr>
-          </a:p>
-          <a:p>
-            <a:pPr lvl="3" marL="1728000" indent="-216000">
-              <a:spcBef>
-                <a:spcPts val="567"/>
-              </a:spcBef>
-              <a:buClr>
-                <a:srgbClr val="ffffff"/>
-              </a:buClr>
-              <a:buSzPct val="75000"/>
-              <a:buFont typeface="Symbol" charset="2"/>
-              <a:buChar char=""/>
-            </a:pPr>
-            <a:r>
-              <a:rPr b="0" lang="en-US" sz="2000" spc="-1" strike="noStrike">
-                <a:latin typeface="Arial"/>
-              </a:rPr>
-              <a:t>Fourth Outline Level</a:t>
-            </a:r>
-            <a:endParaRPr b="0" lang="en-US" sz="2000" spc="-1" strike="noStrike">
-              <a:latin typeface="Arial"/>
-            </a:endParaRPr>
-          </a:p>
-          <a:p>
-            <a:pPr lvl="4" marL="2160000" indent="-216000">
-              <a:spcBef>
-                <a:spcPts val="283"/>
-              </a:spcBef>
-              <a:buClr>
-                <a:srgbClr val="ffffff"/>
-              </a:buClr>
-              <a:buSzPct val="45000"/>
-              <a:buFont typeface="Wingdings" charset="2"/>
-              <a:buChar char=""/>
-            </a:pPr>
-            <a:r>
-              <a:rPr b="0" lang="en-US" sz="2000" spc="-1" strike="noStrike">
-                <a:latin typeface="Arial"/>
-              </a:rPr>
-              <a:t>Fifth Outline Level</a:t>
-            </a:r>
-            <a:endParaRPr b="0" lang="en-US" sz="2000" spc="-1" strike="noStrike">
-              <a:latin typeface="Arial"/>
-            </a:endParaRPr>
-          </a:p>
-          <a:p>
-            <a:pPr lvl="5" marL="2592000" indent="-216000">
-              <a:spcBef>
-                <a:spcPts val="283"/>
-              </a:spcBef>
-              <a:buClr>
-                <a:srgbClr val="ffffff"/>
-              </a:buClr>
-              <a:buSzPct val="45000"/>
-              <a:buFont typeface="Wingdings" charset="2"/>
-              <a:buChar char=""/>
-            </a:pPr>
-            <a:r>
-              <a:rPr b="0" lang="en-US" sz="2000" spc="-1" strike="noStrike">
-                <a:latin typeface="Arial"/>
-              </a:rPr>
-              <a:t>Sixth Outline Level</a:t>
-            </a:r>
-            <a:endParaRPr b="0" lang="en-US" sz="2000" spc="-1" strike="noStrike">
-              <a:latin typeface="Arial"/>
-            </a:endParaRPr>
-          </a:p>
-          <a:p>
-            <a:pPr lvl="6" marL="3024000" indent="-216000">
-              <a:spcBef>
-                <a:spcPts val="283"/>
-              </a:spcBef>
-              <a:buClr>
-                <a:srgbClr val="ffffff"/>
-              </a:buClr>
-              <a:buSzPct val="45000"/>
-              <a:buFont typeface="Wingdings" charset="2"/>
-              <a:buChar char=""/>
-            </a:pPr>
-            <a:r>
-              <a:rPr b="0" lang="en-US" sz="2000" spc="-1" strike="noStrike">
-                <a:latin typeface="Arial"/>
-              </a:rPr>
-              <a:t>Seventh Outline Level</a:t>
-            </a:r>
-            <a:endParaRPr b="0" lang="en-US" sz="2000" spc="-1" strike="noStrike">
-              <a:latin typeface="Arial"/>
             </a:endParaRPr>
           </a:p>
         </p:txBody>
@@ -2725,21 +2499,21 @@
       </p:grpSpPr>
       <p:grpSp>
         <p:nvGrpSpPr>
-          <p:cNvPr id="41" name="Group 10"/>
+          <p:cNvPr id="39" name="Group 10"/>
           <p:cNvGrpSpPr/>
           <p:nvPr/>
         </p:nvGrpSpPr>
         <p:grpSpPr>
           <a:xfrm>
             <a:off x="4756680" y="883800"/>
-            <a:ext cx="4467600" cy="3560400"/>
+            <a:ext cx="4469400" cy="3562200"/>
             <a:chOff x="4756680" y="883800"/>
-            <a:chExt cx="4467600" cy="3560400"/>
+            <a:chExt cx="4469400" cy="3562200"/>
           </a:xfrm>
         </p:grpSpPr>
         <p:pic>
           <p:nvPicPr>
-            <p:cNvPr id="42" name="Изображение 8" descr=""/>
+            <p:cNvPr id="40" name="Изображение 8" descr=""/>
             <p:cNvPicPr/>
             <p:nvPr/>
           </p:nvPicPr>
@@ -2750,7 +2524,7 @@
           <p:spPr>
             <a:xfrm>
               <a:off x="4756680" y="883800"/>
-              <a:ext cx="4467600" cy="3560400"/>
+              <a:ext cx="4469400" cy="3562200"/>
             </a:xfrm>
             <a:prstGeom prst="rect">
               <a:avLst/>
@@ -2762,14 +2536,14 @@
         </p:pic>
         <p:sp>
           <p:nvSpPr>
-            <p:cNvPr id="43" name="Прямоугольник со скругленными углами 3"/>
+            <p:cNvPr id="41" name="Прямоугольник со скругленными углами 3"/>
             <p:cNvSpPr/>
             <p:nvPr/>
           </p:nvSpPr>
           <p:spPr>
             <a:xfrm rot="16200000">
-              <a:off x="6148800" y="1213560"/>
-              <a:ext cx="1735200" cy="2770560"/>
+              <a:off x="6148800" y="1211760"/>
+              <a:ext cx="1737000" cy="2772360"/>
             </a:xfrm>
             <a:prstGeom prst="roundRect">
               <a:avLst>
@@ -2803,14 +2577,14 @@
       </p:grpSp>
       <p:sp>
         <p:nvSpPr>
-          <p:cNvPr id="44" name="TextBox 10"/>
+          <p:cNvPr id="42" name="TextBox 10"/>
           <p:cNvSpPr/>
           <p:nvPr/>
         </p:nvSpPr>
         <p:spPr>
           <a:xfrm>
             <a:off x="497880" y="1319760"/>
-            <a:ext cx="4726800" cy="3440880"/>
+            <a:ext cx="4728600" cy="3442680"/>
           </a:xfrm>
           <a:prstGeom prst="rect">
             <a:avLst/>
@@ -2855,14 +2629,14 @@
       </p:sp>
       <p:sp>
         <p:nvSpPr>
-          <p:cNvPr id="45" name="Прямоугольник со скругленными углами 3"/>
+          <p:cNvPr id="43" name="Прямоугольник со скругленными углами 3"/>
           <p:cNvSpPr/>
           <p:nvPr/>
         </p:nvSpPr>
         <p:spPr>
           <a:xfrm>
-            <a:off x="5632560" y="1728360"/>
-            <a:ext cx="2766600" cy="1733400"/>
+            <a:off x="5631120" y="1727640"/>
+            <a:ext cx="2768760" cy="1735560"/>
           </a:xfrm>
           <a:prstGeom prst="roundRect">
             <a:avLst>
@@ -2921,14 +2695,14 @@
       </p:sp>
       <p:sp>
         <p:nvSpPr>
-          <p:cNvPr id="46" name=""/>
+          <p:cNvPr id="44" name=""/>
           <p:cNvSpPr/>
           <p:nvPr/>
         </p:nvSpPr>
         <p:spPr>
           <a:xfrm>
             <a:off x="466200" y="493920"/>
-            <a:ext cx="7934760" cy="775080"/>
+            <a:ext cx="7944480" cy="775440"/>
           </a:xfrm>
           <a:prstGeom prst="rect">
             <a:avLst/>
@@ -2966,6 +2740,9 @@
               <a:t>TITLE</a:t>
             </a:r>
             <a:endParaRPr b="0" lang="en-US" sz="2400" spc="-1" strike="noStrike">
+              <a:solidFill>
+                <a:srgbClr val="ffffff"/>
+              </a:solidFill>
               <a:latin typeface="Arial"/>
             </a:endParaRPr>
           </a:p>

</xml_diff>